<commit_message>
Build model for frontend and complete slide
</commit_message>
<xml_diff>
--- a/Slide_DataMining.pptx
+++ b/Slide_DataMining.pptx
@@ -238,7 +238,7 @@
           <a:p>
             <a:fld id="{B7268E1E-0E44-426D-905E-8AD9B19D2182}" type="datetimeFigureOut">
               <a:rPr lang="cs-CZ" smtClean="0"/>
-              <a:t>18.12.2025</a:t>
+              <a:t>19.12.2025</a:t>
             </a:fld>
             <a:endParaRPr lang="cs-CZ"/>
           </a:p>
@@ -4385,7 +4385,7 @@
             <a:fld id="{1D8BD707-D9CF-40AE-B4C6-C98DA3205C09}" type="datetimeFigureOut">
               <a:rPr lang="en-US" smtClean="0"/>
               <a:pPr/>
-              <a:t>12/18/2025</a:t>
+              <a:t>12/19/2025</a:t>
             </a:fld>
             <a:endParaRPr lang="en-US"/>
           </a:p>
@@ -4550,7 +4550,7 @@
             <a:fld id="{1D8BD707-D9CF-40AE-B4C6-C98DA3205C09}" type="datetimeFigureOut">
               <a:rPr lang="en-US" smtClean="0"/>
               <a:pPr/>
-              <a:t>12/18/2025</a:t>
+              <a:t>12/19/2025</a:t>
             </a:fld>
             <a:endParaRPr lang="en-US"/>
           </a:p>
@@ -4725,7 +4725,7 @@
             <a:fld id="{1D8BD707-D9CF-40AE-B4C6-C98DA3205C09}" type="datetimeFigureOut">
               <a:rPr lang="en-US" smtClean="0"/>
               <a:pPr/>
-              <a:t>12/18/2025</a:t>
+              <a:t>12/19/2025</a:t>
             </a:fld>
             <a:endParaRPr lang="en-US"/>
           </a:p>
@@ -6960,7 +6960,7 @@
             <a:fld id="{1D8BD707-D9CF-40AE-B4C6-C98DA3205C09}" type="datetimeFigureOut">
               <a:rPr lang="en-US" smtClean="0"/>
               <a:pPr/>
-              <a:t>12/18/2025</a:t>
+              <a:t>12/19/2025</a:t>
             </a:fld>
             <a:endParaRPr lang="en-US"/>
           </a:p>
@@ -7202,7 +7202,7 @@
             <a:fld id="{1D8BD707-D9CF-40AE-B4C6-C98DA3205C09}" type="datetimeFigureOut">
               <a:rPr lang="en-US" smtClean="0"/>
               <a:pPr/>
-              <a:t>12/18/2025</a:t>
+              <a:t>12/19/2025</a:t>
             </a:fld>
             <a:endParaRPr lang="en-US"/>
           </a:p>
@@ -7484,7 +7484,7 @@
             <a:fld id="{1D8BD707-D9CF-40AE-B4C6-C98DA3205C09}" type="datetimeFigureOut">
               <a:rPr lang="en-US" smtClean="0"/>
               <a:pPr/>
-              <a:t>12/18/2025</a:t>
+              <a:t>12/19/2025</a:t>
             </a:fld>
             <a:endParaRPr lang="en-US"/>
           </a:p>
@@ -7900,7 +7900,7 @@
             <a:fld id="{1D8BD707-D9CF-40AE-B4C6-C98DA3205C09}" type="datetimeFigureOut">
               <a:rPr lang="en-US" smtClean="0"/>
               <a:pPr/>
-              <a:t>12/18/2025</a:t>
+              <a:t>12/19/2025</a:t>
             </a:fld>
             <a:endParaRPr lang="en-US"/>
           </a:p>
@@ -8014,7 +8014,7 @@
             <a:fld id="{1D8BD707-D9CF-40AE-B4C6-C98DA3205C09}" type="datetimeFigureOut">
               <a:rPr lang="en-US" smtClean="0"/>
               <a:pPr/>
-              <a:t>12/18/2025</a:t>
+              <a:t>12/19/2025</a:t>
             </a:fld>
             <a:endParaRPr lang="en-US"/>
           </a:p>
@@ -8106,7 +8106,7 @@
             <a:fld id="{1D8BD707-D9CF-40AE-B4C6-C98DA3205C09}" type="datetimeFigureOut">
               <a:rPr lang="en-US" smtClean="0"/>
               <a:pPr/>
-              <a:t>12/18/2025</a:t>
+              <a:t>12/19/2025</a:t>
             </a:fld>
             <a:endParaRPr lang="en-US"/>
           </a:p>
@@ -8378,7 +8378,7 @@
             <a:fld id="{1D8BD707-D9CF-40AE-B4C6-C98DA3205C09}" type="datetimeFigureOut">
               <a:rPr lang="en-US" smtClean="0"/>
               <a:pPr/>
-              <a:t>12/18/2025</a:t>
+              <a:t>12/19/2025</a:t>
             </a:fld>
             <a:endParaRPr lang="en-US"/>
           </a:p>
@@ -8627,7 +8627,7 @@
             <a:fld id="{1D8BD707-D9CF-40AE-B4C6-C98DA3205C09}" type="datetimeFigureOut">
               <a:rPr lang="en-US" smtClean="0"/>
               <a:pPr/>
-              <a:t>12/18/2025</a:t>
+              <a:t>12/19/2025</a:t>
             </a:fld>
             <a:endParaRPr lang="en-US"/>
           </a:p>
@@ -8835,7 +8835,7 @@
             <a:fld id="{1D8BD707-D9CF-40AE-B4C6-C98DA3205C09}" type="datetimeFigureOut">
               <a:rPr lang="en-US" smtClean="0"/>
               <a:pPr/>
-              <a:t>12/18/2025</a:t>
+              <a:t>12/19/2025</a:t>
             </a:fld>
             <a:endParaRPr lang="en-US"/>
           </a:p>
@@ -10460,11 +10460,91 @@
           <a:lstStyle/>
           <a:p>
             <a:r>
+              <a:rPr lang="vi-VN" sz="2800" dirty="0">
+                <a:latin typeface="Times New Roman" panose="02020603050405020304" pitchFamily="18" charset="0"/>
+                <a:cs typeface="Times New Roman" panose="02020603050405020304" pitchFamily="18" charset="0"/>
+              </a:rPr>
+              <a:t>Sử</a:t>
+            </a:r>
+            <a:r>
+              <a:rPr lang="vi-VN" sz="2800" dirty="0"/>
+              <a:t> </a:t>
+            </a:r>
+            <a:r>
+              <a:rPr lang="vi-VN" sz="2800" dirty="0">
+                <a:latin typeface="Times New Roman" panose="02020603050405020304" pitchFamily="18" charset="0"/>
+                <a:cs typeface="Times New Roman" panose="02020603050405020304" pitchFamily="18" charset="0"/>
+              </a:rPr>
+              <a:t>dụng </a:t>
+            </a:r>
+            <a:r>
+              <a:rPr lang="vi-VN" sz="2800" dirty="0" err="1">
+                <a:latin typeface="Times New Roman" panose="02020603050405020304" pitchFamily="18" charset="0"/>
+                <a:cs typeface="Times New Roman" panose="02020603050405020304" pitchFamily="18" charset="0"/>
+              </a:rPr>
+              <a:t>Random</a:t>
+            </a:r>
+            <a:r>
+              <a:rPr lang="vi-VN" sz="2800" dirty="0">
+                <a:latin typeface="Times New Roman" panose="02020603050405020304" pitchFamily="18" charset="0"/>
+                <a:cs typeface="Times New Roman" panose="02020603050405020304" pitchFamily="18" charset="0"/>
+              </a:rPr>
+              <a:t> </a:t>
+            </a:r>
+            <a:r>
+              <a:rPr lang="vi-VN" sz="2800" dirty="0" err="1">
+                <a:latin typeface="Times New Roman" panose="02020603050405020304" pitchFamily="18" charset="0"/>
+                <a:cs typeface="Times New Roman" panose="02020603050405020304" pitchFamily="18" charset="0"/>
+              </a:rPr>
+              <a:t>Forest</a:t>
+            </a:r>
+            <a:r>
+              <a:rPr lang="vi-VN" sz="2800" dirty="0">
+                <a:latin typeface="Times New Roman" panose="02020603050405020304" pitchFamily="18" charset="0"/>
+                <a:cs typeface="Times New Roman" panose="02020603050405020304" pitchFamily="18" charset="0"/>
+              </a:rPr>
+              <a:t> để dự đoán thành công của </a:t>
+            </a:r>
+            <a:r>
+              <a:rPr lang="vi-VN" sz="2800" dirty="0" err="1">
+                <a:latin typeface="Times New Roman" panose="02020603050405020304" pitchFamily="18" charset="0"/>
+                <a:cs typeface="Times New Roman" panose="02020603050405020304" pitchFamily="18" charset="0"/>
+              </a:rPr>
+              <a:t>workout</a:t>
+            </a:r>
+            <a:r>
+              <a:rPr lang="vi-VN" sz="2800" dirty="0">
+                <a:latin typeface="Times New Roman" panose="02020603050405020304" pitchFamily="18" charset="0"/>
+                <a:cs typeface="Times New Roman" panose="02020603050405020304" pitchFamily="18" charset="0"/>
+              </a:rPr>
+              <a:t> </a:t>
+            </a:r>
+            <a:r>
+              <a:rPr lang="vi-VN" sz="2800" dirty="0" err="1">
+                <a:latin typeface="Times New Roman" panose="02020603050405020304" pitchFamily="18" charset="0"/>
+                <a:cs typeface="Times New Roman" panose="02020603050405020304" pitchFamily="18" charset="0"/>
+              </a:rPr>
+              <a:t>plan</a:t>
+            </a:r>
+            <a:r>
+              <a:rPr lang="vi-VN" sz="2800" dirty="0">
+                <a:latin typeface="Times New Roman" panose="02020603050405020304" pitchFamily="18" charset="0"/>
+                <a:cs typeface="Times New Roman" panose="02020603050405020304" pitchFamily="18" charset="0"/>
+              </a:rPr>
+              <a:t> dựa trên thông tin người dùng.</a:t>
+            </a:r>
+            <a:endParaRPr lang="en-US" sz="2800" dirty="0">
+              <a:latin typeface="Times New Roman" panose="02020603050405020304" pitchFamily="18" charset="0"/>
+              <a:cs typeface="Times New Roman" panose="02020603050405020304" pitchFamily="18" charset="0"/>
+            </a:endParaRPr>
+          </a:p>
+          <a:p>
+            <a:r>
               <a:rPr lang="en-US" sz="2800" dirty="0" err="1">
                 <a:latin typeface="Times New Roman" panose="02020603050405020304" pitchFamily="18" charset="0"/>
                 <a:cs typeface="Times New Roman" panose="02020603050405020304" pitchFamily="18" charset="0"/>
               </a:rPr>
-              <a:t>Nhóm</a:t>
+              <a:t>Ứng</a:t>
             </a:r>
             <a:r>
               <a:rPr lang="en-US" sz="2800" dirty="0">
@@ -10478,13 +10558,27 @@
                 <a:latin typeface="Times New Roman" panose="02020603050405020304" pitchFamily="18" charset="0"/>
                 <a:cs typeface="Times New Roman" panose="02020603050405020304" pitchFamily="18" charset="0"/>
               </a:rPr>
-              <a:t>sử</a:t>
+              <a:t>dụng</a:t>
             </a:r>
             <a:r>
               <a:rPr lang="en-US" sz="2800" dirty="0">
                 <a:latin typeface="Times New Roman" panose="02020603050405020304" pitchFamily="18" charset="0"/>
                 <a:cs typeface="Times New Roman" panose="02020603050405020304" pitchFamily="18" charset="0"/>
               </a:rPr>
+              <a:t>: </a:t>
+            </a:r>
+            <a:r>
+              <a:rPr lang="en-US" sz="2800" dirty="0" err="1">
+                <a:latin typeface="Times New Roman" panose="02020603050405020304" pitchFamily="18" charset="0"/>
+                <a:cs typeface="Times New Roman" panose="02020603050405020304" pitchFamily="18" charset="0"/>
+              </a:rPr>
+              <a:t>Dự</a:t>
+            </a:r>
+            <a:r>
+              <a:rPr lang="en-US" sz="2800" dirty="0">
+                <a:latin typeface="Times New Roman" panose="02020603050405020304" pitchFamily="18" charset="0"/>
+                <a:cs typeface="Times New Roman" panose="02020603050405020304" pitchFamily="18" charset="0"/>
+              </a:rPr>
               <a:t> </a:t>
             </a:r>
             <a:r>
@@ -10492,7 +10586,7 @@
                 <a:latin typeface="Times New Roman" panose="02020603050405020304" pitchFamily="18" charset="0"/>
                 <a:cs typeface="Times New Roman" panose="02020603050405020304" pitchFamily="18" charset="0"/>
               </a:rPr>
-              <a:t>dụng</a:t>
+              <a:t>đoán</a:t>
             </a:r>
             <a:r>
               <a:rPr lang="en-US" sz="2800" dirty="0">
@@ -10506,7 +10600,7 @@
                 <a:latin typeface="Times New Roman" panose="02020603050405020304" pitchFamily="18" charset="0"/>
                 <a:cs typeface="Times New Roman" panose="02020603050405020304" pitchFamily="18" charset="0"/>
               </a:rPr>
-              <a:t>thuật</a:t>
+              <a:t>xác</a:t>
             </a:r>
             <a:r>
               <a:rPr lang="en-US" sz="2800" dirty="0">
@@ -10520,21 +10614,21 @@
                 <a:latin typeface="Times New Roman" panose="02020603050405020304" pitchFamily="18" charset="0"/>
                 <a:cs typeface="Times New Roman" panose="02020603050405020304" pitchFamily="18" charset="0"/>
               </a:rPr>
-              <a:t>toán</a:t>
+              <a:t>suất</a:t>
             </a:r>
             <a:r>
               <a:rPr lang="en-US" sz="2800" dirty="0">
                 <a:latin typeface="Times New Roman" panose="02020603050405020304" pitchFamily="18" charset="0"/>
                 <a:cs typeface="Times New Roman" panose="02020603050405020304" pitchFamily="18" charset="0"/>
               </a:rPr>
-              <a:t> Random Forest </a:t>
+              <a:t> </a:t>
             </a:r>
             <a:r>
               <a:rPr lang="en-US" sz="2800" dirty="0" err="1">
                 <a:latin typeface="Times New Roman" panose="02020603050405020304" pitchFamily="18" charset="0"/>
                 <a:cs typeface="Times New Roman" panose="02020603050405020304" pitchFamily="18" charset="0"/>
               </a:rPr>
-              <a:t>để</a:t>
+              <a:t>thành</a:t>
             </a:r>
             <a:r>
               <a:rPr lang="en-US" sz="2800" dirty="0">
@@ -10548,7 +10642,7 @@
                 <a:latin typeface="Times New Roman" panose="02020603050405020304" pitchFamily="18" charset="0"/>
                 <a:cs typeface="Times New Roman" panose="02020603050405020304" pitchFamily="18" charset="0"/>
               </a:rPr>
-              <a:t>huấn</a:t>
+              <a:t>công</a:t>
             </a:r>
             <a:r>
               <a:rPr lang="en-US" sz="2800" dirty="0">
@@ -10562,7 +10656,7 @@
                 <a:latin typeface="Times New Roman" panose="02020603050405020304" pitchFamily="18" charset="0"/>
                 <a:cs typeface="Times New Roman" panose="02020603050405020304" pitchFamily="18" charset="0"/>
               </a:rPr>
-              <a:t>luyện</a:t>
+              <a:t>cá</a:t>
             </a:r>
             <a:r>
               <a:rPr lang="en-US" sz="2800" dirty="0">
@@ -10576,7 +10670,7 @@
                 <a:latin typeface="Times New Roman" panose="02020603050405020304" pitchFamily="18" charset="0"/>
                 <a:cs typeface="Times New Roman" panose="02020603050405020304" pitchFamily="18" charset="0"/>
               </a:rPr>
-              <a:t>mô</a:t>
+              <a:t>nhân</a:t>
             </a:r>
             <a:r>
               <a:rPr lang="en-US" sz="2800" dirty="0">
@@ -10590,7 +10684,7 @@
                 <a:latin typeface="Times New Roman" panose="02020603050405020304" pitchFamily="18" charset="0"/>
                 <a:cs typeface="Times New Roman" panose="02020603050405020304" pitchFamily="18" charset="0"/>
               </a:rPr>
-              <a:t>hình</a:t>
+              <a:t>hóa</a:t>
             </a:r>
             <a:r>
               <a:rPr lang="en-US" sz="2800" dirty="0">
@@ -10604,7 +10698,7 @@
                 <a:latin typeface="Times New Roman" panose="02020603050405020304" pitchFamily="18" charset="0"/>
                 <a:cs typeface="Times New Roman" panose="02020603050405020304" pitchFamily="18" charset="0"/>
               </a:rPr>
-              <a:t>dự</a:t>
+              <a:t>trong</a:t>
             </a:r>
             <a:r>
               <a:rPr lang="en-US" sz="2800" dirty="0">
@@ -10618,7 +10712,7 @@
                 <a:latin typeface="Times New Roman" panose="02020603050405020304" pitchFamily="18" charset="0"/>
                 <a:cs typeface="Times New Roman" panose="02020603050405020304" pitchFamily="18" charset="0"/>
               </a:rPr>
-              <a:t>đoán</a:t>
+              <a:t>hệ</a:t>
             </a:r>
             <a:r>
               <a:rPr lang="en-US" sz="2800" dirty="0">
@@ -10632,7 +10726,7 @@
                 <a:latin typeface="Times New Roman" panose="02020603050405020304" pitchFamily="18" charset="0"/>
                 <a:cs typeface="Times New Roman" panose="02020603050405020304" pitchFamily="18" charset="0"/>
               </a:rPr>
-              <a:t>xem</a:t>
+              <a:t>khuyến</a:t>
             </a:r>
             <a:r>
               <a:rPr lang="en-US" sz="2800" dirty="0">
@@ -10646,135 +10740,23 @@
                 <a:latin typeface="Times New Roman" panose="02020603050405020304" pitchFamily="18" charset="0"/>
                 <a:cs typeface="Times New Roman" panose="02020603050405020304" pitchFamily="18" charset="0"/>
               </a:rPr>
-              <a:t>kế</a:t>
+              <a:t>nghị</a:t>
             </a:r>
             <a:r>
               <a:rPr lang="en-US" sz="2800" dirty="0">
                 <a:latin typeface="Times New Roman" panose="02020603050405020304" pitchFamily="18" charset="0"/>
                 <a:cs typeface="Times New Roman" panose="02020603050405020304" pitchFamily="18" charset="0"/>
               </a:rPr>
-              <a:t> </a:t>
-            </a:r>
-            <a:r>
-              <a:rPr lang="en-US" sz="2800" dirty="0" err="1">
-                <a:latin typeface="Times New Roman" panose="02020603050405020304" pitchFamily="18" charset="0"/>
-                <a:cs typeface="Times New Roman" panose="02020603050405020304" pitchFamily="18" charset="0"/>
-              </a:rPr>
-              <a:t>hoạch</a:t>
-            </a:r>
+              <a:t>.</a:t>
+            </a:r>
+          </a:p>
+          <a:p>
             <a:r>
               <a:rPr lang="en-US" sz="2800" dirty="0">
                 <a:latin typeface="Times New Roman" panose="02020603050405020304" pitchFamily="18" charset="0"/>
                 <a:cs typeface="Times New Roman" panose="02020603050405020304" pitchFamily="18" charset="0"/>
               </a:rPr>
-              <a:t> workout </a:t>
-            </a:r>
-            <a:r>
-              <a:rPr lang="en-US" sz="2800" dirty="0" err="1">
-                <a:latin typeface="Times New Roman" panose="02020603050405020304" pitchFamily="18" charset="0"/>
-                <a:cs typeface="Times New Roman" panose="02020603050405020304" pitchFamily="18" charset="0"/>
-              </a:rPr>
-              <a:t>của</a:t>
-            </a:r>
-            <a:r>
-              <a:rPr lang="en-US" sz="2800" dirty="0">
-                <a:latin typeface="Times New Roman" panose="02020603050405020304" pitchFamily="18" charset="0"/>
-                <a:cs typeface="Times New Roman" panose="02020603050405020304" pitchFamily="18" charset="0"/>
-              </a:rPr>
-              <a:t> </a:t>
-            </a:r>
-            <a:r>
-              <a:rPr lang="en-US" sz="2800" dirty="0" err="1">
-                <a:latin typeface="Times New Roman" panose="02020603050405020304" pitchFamily="18" charset="0"/>
-                <a:cs typeface="Times New Roman" panose="02020603050405020304" pitchFamily="18" charset="0"/>
-              </a:rPr>
-              <a:t>người</a:t>
-            </a:r>
-            <a:r>
-              <a:rPr lang="en-US" sz="2800" dirty="0">
-                <a:latin typeface="Times New Roman" panose="02020603050405020304" pitchFamily="18" charset="0"/>
-                <a:cs typeface="Times New Roman" panose="02020603050405020304" pitchFamily="18" charset="0"/>
-              </a:rPr>
-              <a:t> </a:t>
-            </a:r>
-            <a:r>
-              <a:rPr lang="en-US" sz="2800" dirty="0" err="1">
-                <a:latin typeface="Times New Roman" panose="02020603050405020304" pitchFamily="18" charset="0"/>
-                <a:cs typeface="Times New Roman" panose="02020603050405020304" pitchFamily="18" charset="0"/>
-              </a:rPr>
-              <a:t>dùng</a:t>
-            </a:r>
-            <a:r>
-              <a:rPr lang="en-US" sz="2800" dirty="0">
-                <a:latin typeface="Times New Roman" panose="02020603050405020304" pitchFamily="18" charset="0"/>
-                <a:cs typeface="Times New Roman" panose="02020603050405020304" pitchFamily="18" charset="0"/>
-              </a:rPr>
-              <a:t> </a:t>
-            </a:r>
-            <a:r>
-              <a:rPr lang="en-US" sz="2800" dirty="0" err="1">
-                <a:latin typeface="Times New Roman" panose="02020603050405020304" pitchFamily="18" charset="0"/>
-                <a:cs typeface="Times New Roman" panose="02020603050405020304" pitchFamily="18" charset="0"/>
-              </a:rPr>
-              <a:t>có</a:t>
-            </a:r>
-            <a:r>
-              <a:rPr lang="en-US" sz="2800" dirty="0">
-                <a:latin typeface="Times New Roman" panose="02020603050405020304" pitchFamily="18" charset="0"/>
-                <a:cs typeface="Times New Roman" panose="02020603050405020304" pitchFamily="18" charset="0"/>
-              </a:rPr>
-              <a:t> </a:t>
-            </a:r>
-            <a:r>
-              <a:rPr lang="en-US" sz="2800" dirty="0" err="1">
-                <a:latin typeface="Times New Roman" panose="02020603050405020304" pitchFamily="18" charset="0"/>
-                <a:cs typeface="Times New Roman" panose="02020603050405020304" pitchFamily="18" charset="0"/>
-              </a:rPr>
-              <a:t>thành</a:t>
-            </a:r>
-            <a:r>
-              <a:rPr lang="en-US" sz="2800" dirty="0">
-                <a:latin typeface="Times New Roman" panose="02020603050405020304" pitchFamily="18" charset="0"/>
-                <a:cs typeface="Times New Roman" panose="02020603050405020304" pitchFamily="18" charset="0"/>
-              </a:rPr>
-              <a:t> </a:t>
-            </a:r>
-            <a:r>
-              <a:rPr lang="en-US" sz="2800" dirty="0" err="1">
-                <a:latin typeface="Times New Roman" panose="02020603050405020304" pitchFamily="18" charset="0"/>
-                <a:cs typeface="Times New Roman" panose="02020603050405020304" pitchFamily="18" charset="0"/>
-              </a:rPr>
-              <a:t>công</a:t>
-            </a:r>
-            <a:r>
-              <a:rPr lang="en-US" sz="2800" dirty="0">
-                <a:latin typeface="Times New Roman" panose="02020603050405020304" pitchFamily="18" charset="0"/>
-                <a:cs typeface="Times New Roman" panose="02020603050405020304" pitchFamily="18" charset="0"/>
-              </a:rPr>
-              <a:t> hay </a:t>
-            </a:r>
-            <a:r>
-              <a:rPr lang="en-US" sz="2800" dirty="0" err="1">
-                <a:latin typeface="Times New Roman" panose="02020603050405020304" pitchFamily="18" charset="0"/>
-                <a:cs typeface="Times New Roman" panose="02020603050405020304" pitchFamily="18" charset="0"/>
-              </a:rPr>
-              <a:t>không</a:t>
-            </a:r>
-            <a:r>
-              <a:rPr lang="en-US" sz="2800" dirty="0">
-                <a:latin typeface="Times New Roman" panose="02020603050405020304" pitchFamily="18" charset="0"/>
-                <a:cs typeface="Times New Roman" panose="02020603050405020304" pitchFamily="18" charset="0"/>
-              </a:rPr>
-              <a:t>?</a:t>
-            </a:r>
-          </a:p>
-          <a:p>
-            <a:r>
-              <a:rPr lang="en-US" sz="2800" dirty="0">
-                <a:latin typeface="Times New Roman" panose="02020603050405020304" pitchFamily="18" charset="0"/>
-                <a:cs typeface="Times New Roman" panose="02020603050405020304" pitchFamily="18" charset="0"/>
-              </a:rPr>
-              <a:t>Input: File dataset 3</a:t>
+              <a:t>Input: File gym_workout_sessions.csv</a:t>
             </a:r>
           </a:p>
           <a:p>
@@ -10807,38 +10789,8 @@
         </p:blipFill>
         <p:spPr>
           <a:xfrm>
-            <a:off x="9489456" y="4006806"/>
-            <a:ext cx="7681913" cy="4582739"/>
-          </a:xfrm>
-          <a:prstGeom prst="rect">
-            <a:avLst/>
-          </a:prstGeom>
-        </p:spPr>
-      </p:pic>
-      <p:pic>
-        <p:nvPicPr>
-          <p:cNvPr id="9" name="Hình ảnh 8" descr="Ảnh có chứa văn bản, ảnh chụp màn hình, Phông chữ&#10;&#10;Nội dung do AI tạo ra có thể không chính xác.">
-            <a:extLst>
-              <a:ext uri="{FF2B5EF4-FFF2-40B4-BE49-F238E27FC236}">
-                <a16:creationId xmlns:a16="http://schemas.microsoft.com/office/drawing/2014/main" id="{EB0277A0-B408-7742-1CE6-D3ADDF4BFBFE}"/>
-              </a:ext>
-            </a:extLst>
-          </p:cNvPr>
-          <p:cNvPicPr>
-            <a:picLocks noChangeAspect="1"/>
-          </p:cNvPicPr>
-          <p:nvPr/>
-        </p:nvPicPr>
-        <p:blipFill>
-          <a:blip r:embed="rId8"/>
-          <a:stretch>
-            <a:fillRect/>
-          </a:stretch>
-        </p:blipFill>
-        <p:spPr>
-          <a:xfrm>
-            <a:off x="1130486" y="4006806"/>
-            <a:ext cx="6994615" cy="4170329"/>
+            <a:off x="3562414" y="3319134"/>
+            <a:ext cx="9944167" cy="5932314"/>
           </a:xfrm>
           <a:prstGeom prst="rect">
             <a:avLst/>
@@ -11406,8 +11358,8 @@
         </p:nvSpPr>
         <p:spPr>
           <a:xfrm>
-            <a:off x="636919" y="1638300"/>
-            <a:ext cx="10169513" cy="461665"/>
+            <a:off x="623064" y="1183163"/>
+            <a:ext cx="16421046" cy="1569660"/>
           </a:xfrm>
           <a:prstGeom prst="rect">
             <a:avLst/>
@@ -11422,24 +11374,66 @@
           <a:p>
             <a:r>
               <a:rPr lang="vi-VN" sz="2400" dirty="0">
-                <a:latin typeface="+mj-lt"/>
+                <a:latin typeface="Times New Roman" panose="02020603050405020304" pitchFamily="18" charset="0"/>
+                <a:cs typeface="Times New Roman" panose="02020603050405020304" pitchFamily="18" charset="0"/>
               </a:rPr>
               <a:t>Mục tiêu: Phân nhóm người tập </a:t>
             </a:r>
             <a:r>
               <a:rPr lang="vi-VN" sz="2400" dirty="0" err="1">
-                <a:latin typeface="+mj-lt"/>
+                <a:latin typeface="Times New Roman" panose="02020603050405020304" pitchFamily="18" charset="0"/>
+                <a:cs typeface="Times New Roman" panose="02020603050405020304" pitchFamily="18" charset="0"/>
               </a:rPr>
               <a:t>gym</a:t>
             </a:r>
             <a:r>
               <a:rPr lang="vi-VN" sz="2400" dirty="0">
-                <a:latin typeface="+mj-lt"/>
-              </a:rPr>
-              <a:t> thành các nhóm có đặc điểm tương đồng</a:t>
+                <a:latin typeface="Times New Roman" panose="02020603050405020304" pitchFamily="18" charset="0"/>
+                <a:cs typeface="Times New Roman" panose="02020603050405020304" pitchFamily="18" charset="0"/>
+              </a:rPr>
+              <a:t> thành 4 cụm theo đặc điểm thể chất và tần suất tập luyện, để tìm ra nhóm có tỷ lệ thành công </a:t>
+            </a:r>
+          </a:p>
+          <a:p>
+            <a:r>
+              <a:rPr lang="vi-VN" sz="2400" dirty="0">
+                <a:latin typeface="Times New Roman" panose="02020603050405020304" pitchFamily="18" charset="0"/>
+                <a:cs typeface="Times New Roman" panose="02020603050405020304" pitchFamily="18" charset="0"/>
+              </a:rPr>
+              <a:t>cao nhất và cá nhân hóa gợi ý </a:t>
+            </a:r>
+            <a:r>
+              <a:rPr lang="vi-VN" sz="2400" dirty="0" err="1">
+                <a:latin typeface="Times New Roman" panose="02020603050405020304" pitchFamily="18" charset="0"/>
+                <a:cs typeface="Times New Roman" panose="02020603050405020304" pitchFamily="18" charset="0"/>
+              </a:rPr>
+              <a:t>workout</a:t>
+            </a:r>
+            <a:r>
+              <a:rPr lang="vi-VN" sz="2400" dirty="0">
+                <a:latin typeface="Times New Roman" panose="02020603050405020304" pitchFamily="18" charset="0"/>
+                <a:cs typeface="Times New Roman" panose="02020603050405020304" pitchFamily="18" charset="0"/>
+              </a:rPr>
+              <a:t> trong hệ thống.</a:t>
             </a:r>
             <a:endParaRPr lang="en-US" sz="2400" dirty="0">
-              <a:latin typeface="+mj-lt"/>
+              <a:latin typeface="Times New Roman" panose="02020603050405020304" pitchFamily="18" charset="0"/>
+              <a:cs typeface="Times New Roman" panose="02020603050405020304" pitchFamily="18" charset="0"/>
+            </a:endParaRPr>
+          </a:p>
+          <a:p>
+            <a:r>
+              <a:rPr lang="en-US" sz="2400" dirty="0">
+                <a:latin typeface="Times New Roman" panose="02020603050405020304" pitchFamily="18" charset="0"/>
+                <a:cs typeface="Times New Roman" panose="02020603050405020304" pitchFamily="18" charset="0"/>
+              </a:rPr>
+              <a:t>Input: File gym_workout_sessions.csv</a:t>
+            </a:r>
+          </a:p>
+          <a:p>
+            <a:endParaRPr lang="en-US" sz="2400" dirty="0">
+              <a:latin typeface="Times New Roman" panose="02020603050405020304" pitchFamily="18" charset="0"/>
+              <a:cs typeface="Times New Roman" panose="02020603050405020304" pitchFamily="18" charset="0"/>
             </a:endParaRPr>
           </a:p>
         </p:txBody>
@@ -11458,7 +11452,7 @@
         </p:nvSpPr>
         <p:spPr>
           <a:xfrm>
-            <a:off x="636919" y="2178463"/>
+            <a:off x="623064" y="2401404"/>
             <a:ext cx="12741002" cy="738664"/>
           </a:xfrm>
           <a:prstGeom prst="rect">
@@ -11549,7 +11543,7 @@
           <p:nvPr>
             <p:extLst>
               <p:ext uri="{D42A27DB-BD31-4B8C-83A1-F6EECF244321}">
-                <p14:modId xmlns:p14="http://schemas.microsoft.com/office/powerpoint/2010/main" val="759132646"/>
+                <p14:modId xmlns:p14="http://schemas.microsoft.com/office/powerpoint/2010/main" val="2462164015"/>
               </p:ext>
             </p:extLst>
           </p:nvPr>
@@ -12195,7 +12189,51 @@
                           <a:latin typeface="Times New Roman" panose="02020603050405020304" pitchFamily="18" charset="0"/>
                           <a:cs typeface="Times New Roman" panose="02020603050405020304" pitchFamily="18" charset="0"/>
                         </a:rPr>
-                        <a:t>Cluster 3: NHÓM THÀNH CÔNG NHẤT </a:t>
+                        <a:t>Cluster 3: </a:t>
+                      </a:r>
+                      <a:r>
+                        <a:rPr lang="vi-VN" sz="2400" b="1" kern="1200" dirty="0">
+                          <a:solidFill>
+                            <a:schemeClr val="tx1"/>
+                          </a:solidFill>
+                          <a:latin typeface="Times New Roman" panose="02020603050405020304" pitchFamily="18" charset="0"/>
+                          <a:ea typeface="+mn-ea"/>
+                          <a:cs typeface="Times New Roman" panose="02020603050405020304" pitchFamily="18" charset="0"/>
+                        </a:rPr>
+                        <a:t>Người tập đều, </a:t>
+                      </a:r>
+                      <a:r>
+                        <a:rPr lang="vi-VN" sz="2400" b="1" kern="1200" dirty="0" err="1">
+                          <a:solidFill>
+                            <a:schemeClr val="tx1"/>
+                          </a:solidFill>
+                          <a:latin typeface="Times New Roman" panose="02020603050405020304" pitchFamily="18" charset="0"/>
+                          <a:ea typeface="+mn-ea"/>
+                          <a:cs typeface="Times New Roman" panose="02020603050405020304" pitchFamily="18" charset="0"/>
+                        </a:rPr>
+                        <a:t>Fat</a:t>
+                      </a:r>
+                      <a:r>
+                        <a:rPr lang="vi-VN" sz="2400" b="1" kern="1200" dirty="0">
+                          <a:solidFill>
+                            <a:schemeClr val="tx1"/>
+                          </a:solidFill>
+                          <a:latin typeface="Times New Roman" panose="02020603050405020304" pitchFamily="18" charset="0"/>
+                          <a:ea typeface="+mn-ea"/>
+                          <a:cs typeface="Times New Roman" panose="02020603050405020304" pitchFamily="18" charset="0"/>
+                        </a:rPr>
+                        <a:t>% thấp</a:t>
+                      </a:r>
+                      <a:r>
+                        <a:rPr lang="en-US" sz="2400" b="1" kern="1200" dirty="0">
+                          <a:solidFill>
+                            <a:schemeClr val="tx1"/>
+                          </a:solidFill>
+                          <a:latin typeface="Times New Roman" panose="02020603050405020304" pitchFamily="18" charset="0"/>
+                          <a:ea typeface="+mn-ea"/>
+                          <a:cs typeface="Times New Roman" panose="02020603050405020304" pitchFamily="18" charset="0"/>
+                        </a:rPr>
+                        <a:t> </a:t>
                       </a:r>
                     </a:p>
                     <a:p>
@@ -12752,7 +12790,7 @@
                 <a:latin typeface="Times New Roman" panose="02020603050405020304" pitchFamily="18" charset="0"/>
                 <a:cs typeface="Times New Roman" panose="02020603050405020304" pitchFamily="18" charset="0"/>
               </a:rPr>
-              <a:t>- Fat% </a:t>
+              <a:t>Fat% </a:t>
             </a:r>
             <a:r>
               <a:rPr lang="en-US" sz="2400" dirty="0" err="1">
@@ -22734,7 +22772,35 @@
                 <a:latin typeface="Times New Roman" panose="02020603050405020304" pitchFamily="18" charset="0"/>
                 <a:cs typeface="Times New Roman" panose="02020603050405020304" pitchFamily="18" charset="0"/>
               </a:rPr>
-              <a:t>Bộ dữ liệu 1: Thông tin </a:t>
+              <a:t>Bộ dữ liệu 1: </a:t>
+            </a:r>
+            <a:r>
+              <a:rPr lang="en-US" sz="2800" b="1" dirty="0">
+                <a:latin typeface="Times New Roman" panose="02020603050405020304" pitchFamily="18" charset="0"/>
+                <a:cs typeface="Times New Roman" panose="02020603050405020304" pitchFamily="18" charset="0"/>
+              </a:rPr>
+              <a:t>gym_members_exercise_tracking.csv </a:t>
+            </a:r>
+            <a:r>
+              <a:rPr lang="en-US" sz="2800" b="1" dirty="0" err="1">
+                <a:latin typeface="Times New Roman" panose="02020603050405020304" pitchFamily="18" charset="0"/>
+                <a:cs typeface="Times New Roman" panose="02020603050405020304" pitchFamily="18" charset="0"/>
+              </a:rPr>
+              <a:t>chứa</a:t>
+            </a:r>
+            <a:r>
+              <a:rPr lang="en-US" sz="2800" b="1" dirty="0">
+                <a:latin typeface="Times New Roman" panose="02020603050405020304" pitchFamily="18" charset="0"/>
+                <a:cs typeface="Times New Roman" panose="02020603050405020304" pitchFamily="18" charset="0"/>
+              </a:rPr>
+              <a:t> t</a:t>
+            </a:r>
+            <a:r>
+              <a:rPr lang="vi-VN" sz="2800" b="1" dirty="0">
+                <a:latin typeface="Times New Roman" panose="02020603050405020304" pitchFamily="18" charset="0"/>
+                <a:cs typeface="Times New Roman" panose="02020603050405020304" pitchFamily="18" charset="0"/>
+              </a:rPr>
+              <a:t>hông tin </a:t>
             </a:r>
             <a:r>
               <a:rPr lang="vi-VN" sz="2800" b="1" dirty="0" err="1">
@@ -22882,7 +22948,35 @@
                 <a:latin typeface="Times New Roman" panose="02020603050405020304" pitchFamily="18" charset="0"/>
                 <a:cs typeface="Times New Roman" panose="02020603050405020304" pitchFamily="18" charset="0"/>
               </a:rPr>
-              <a:t>Bộ dữ liệu 2: Thư viện bài tập </a:t>
+              <a:t>Bộ dữ liệu 2: megaGymDataset.csv</a:t>
+            </a:r>
+            <a:r>
+              <a:rPr lang="en-US" sz="2800" b="1" dirty="0">
+                <a:latin typeface="Times New Roman" panose="02020603050405020304" pitchFamily="18" charset="0"/>
+                <a:cs typeface="Times New Roman" panose="02020603050405020304" pitchFamily="18" charset="0"/>
+              </a:rPr>
+              <a:t> </a:t>
+            </a:r>
+            <a:r>
+              <a:rPr lang="en-US" sz="2800" b="1" dirty="0" err="1">
+                <a:latin typeface="Times New Roman" panose="02020603050405020304" pitchFamily="18" charset="0"/>
+                <a:cs typeface="Times New Roman" panose="02020603050405020304" pitchFamily="18" charset="0"/>
+              </a:rPr>
+              <a:t>chứa</a:t>
+            </a:r>
+            <a:r>
+              <a:rPr lang="en-US" sz="2800" b="1" dirty="0">
+                <a:latin typeface="Times New Roman" panose="02020603050405020304" pitchFamily="18" charset="0"/>
+                <a:cs typeface="Times New Roman" panose="02020603050405020304" pitchFamily="18" charset="0"/>
+              </a:rPr>
+              <a:t> t</a:t>
+            </a:r>
+            <a:r>
+              <a:rPr lang="vi-VN" sz="2800" b="1" dirty="0">
+                <a:latin typeface="Times New Roman" panose="02020603050405020304" pitchFamily="18" charset="0"/>
+                <a:cs typeface="Times New Roman" panose="02020603050405020304" pitchFamily="18" charset="0"/>
+              </a:rPr>
+              <a:t>hư viện bài tập </a:t>
             </a:r>
             <a:endParaRPr lang="en-US" sz="2800" b="1" dirty="0">
               <a:latin typeface="Times New Roman" panose="02020603050405020304" pitchFamily="18" charset="0"/>
@@ -23701,7 +23795,7 @@
         <p:spPr>
           <a:xfrm>
             <a:off x="838200" y="1502903"/>
-            <a:ext cx="10993874" cy="7848302"/>
+            <a:ext cx="17356608" cy="7848302"/>
           </a:xfrm>
           <a:prstGeom prst="rect">
             <a:avLst/>
@@ -23786,10 +23880,38 @@
               <a:t> </a:t>
             </a:r>
             <a:r>
+              <a:rPr lang="en-US" sz="2800" b="1" dirty="0">
+                <a:latin typeface="Times New Roman" panose="02020603050405020304" pitchFamily="18" charset="0"/>
+                <a:cs typeface="Times New Roman" panose="02020603050405020304" pitchFamily="18" charset="0"/>
+              </a:rPr>
+              <a:t>gym_members_exercise_tracking.csv </a:t>
+            </a:r>
+            <a:r>
               <a:rPr lang="en-US" sz="2800" dirty="0" err="1">
                 <a:latin typeface="Times New Roman" panose="02020603050405020304" pitchFamily="18" charset="0"/>
                 <a:cs typeface="Times New Roman" panose="02020603050405020304" pitchFamily="18" charset="0"/>
               </a:rPr>
+              <a:t>và</a:t>
+            </a:r>
+            <a:r>
+              <a:rPr lang="en-US" sz="2800" dirty="0">
+                <a:latin typeface="Times New Roman" panose="02020603050405020304" pitchFamily="18" charset="0"/>
+                <a:cs typeface="Times New Roman" panose="02020603050405020304" pitchFamily="18" charset="0"/>
+              </a:rPr>
+              <a:t> </a:t>
+            </a:r>
+            <a:r>
+              <a:rPr lang="en-US" sz="2800" b="1" dirty="0">
+                <a:latin typeface="Times New Roman" panose="02020603050405020304" pitchFamily="18" charset="0"/>
+                <a:cs typeface="Times New Roman" panose="02020603050405020304" pitchFamily="18" charset="0"/>
+              </a:rPr>
+              <a:t>megaGymDataset.csv </a:t>
+            </a:r>
+            <a:r>
+              <a:rPr lang="en-US" sz="2800" dirty="0" err="1">
+                <a:latin typeface="Times New Roman" panose="02020603050405020304" pitchFamily="18" charset="0"/>
+                <a:cs typeface="Times New Roman" panose="02020603050405020304" pitchFamily="18" charset="0"/>
+              </a:rPr>
               <a:t>thành</a:t>
             </a:r>
             <a:r>
@@ -23812,6 +23934,13 @@
                 <a:cs typeface="Times New Roman" panose="02020603050405020304" pitchFamily="18" charset="0"/>
               </a:rPr>
               <a:t> </a:t>
+            </a:r>
+            <a:r>
+              <a:rPr lang="en-US" sz="2800" b="1" dirty="0">
+                <a:latin typeface="Times New Roman" panose="02020603050405020304" pitchFamily="18" charset="0"/>
+                <a:cs typeface="Times New Roman" panose="02020603050405020304" pitchFamily="18" charset="0"/>
+              </a:rPr>
+              <a:t>gym_workout_sessions.csv </a:t>
             </a:r>
             <a:r>
               <a:rPr lang="en-US" sz="2800" dirty="0" err="1">
@@ -25496,7 +25625,7 @@
         </p:nvSpPr>
         <p:spPr>
           <a:xfrm>
-            <a:off x="5704122" y="6730021"/>
+            <a:off x="457200" y="5863457"/>
             <a:ext cx="9144000" cy="1815882"/>
           </a:xfrm>
           <a:prstGeom prst="rect">
@@ -25860,7 +25989,7 @@
                 <a:latin typeface="Times New Roman" panose="02020603050405020304" pitchFamily="18" charset="0"/>
                 <a:cs typeface="Times New Roman" panose="02020603050405020304" pitchFamily="18" charset="0"/>
               </a:rPr>
-              <a:t>có</a:t>
+              <a:t>cho</a:t>
             </a:r>
             <a:r>
               <a:rPr lang="en-US" sz="2800" dirty="0">
@@ -25874,7 +26003,7 @@
                 <a:latin typeface="Times New Roman" panose="02020603050405020304" pitchFamily="18" charset="0"/>
                 <a:cs typeface="Times New Roman" panose="02020603050405020304" pitchFamily="18" charset="0"/>
               </a:rPr>
-              <a:t>độ</a:t>
+              <a:t>hiệu</a:t>
             </a:r>
             <a:r>
               <a:rPr lang="en-US" sz="2800" dirty="0">
@@ -25888,7 +26017,7 @@
                 <a:latin typeface="Times New Roman" panose="02020603050405020304" pitchFamily="18" charset="0"/>
                 <a:cs typeface="Times New Roman" panose="02020603050405020304" pitchFamily="18" charset="0"/>
               </a:rPr>
-              <a:t>nâng</a:t>
+              <a:t>quả</a:t>
             </a:r>
             <a:r>
               <a:rPr lang="en-US" sz="2800" dirty="0">
@@ -25939,8 +26068,8 @@
         </p:nvSpPr>
         <p:spPr>
           <a:xfrm>
-            <a:off x="1399032" y="2503560"/>
-            <a:ext cx="6868880" cy="3414627"/>
+            <a:off x="636919" y="2336117"/>
+            <a:ext cx="6868880" cy="1815882"/>
           </a:xfrm>
           <a:prstGeom prst="rect">
             <a:avLst/>
@@ -26085,7 +26214,7 @@
         </p:nvSpPr>
         <p:spPr>
           <a:xfrm>
-            <a:off x="1399032" y="2029046"/>
+            <a:off x="636919" y="1337080"/>
             <a:ext cx="6868880" cy="980853"/>
           </a:xfrm>
           <a:prstGeom prst="rect">
@@ -26305,8 +26434,8 @@
         </p:nvSpPr>
         <p:spPr>
           <a:xfrm>
-            <a:off x="10276122" y="2503560"/>
-            <a:ext cx="6868880" cy="3414627"/>
+            <a:off x="7912868" y="1946141"/>
+            <a:ext cx="10069278" cy="8271833"/>
           </a:xfrm>
           <a:prstGeom prst="rect">
             <a:avLst/>
@@ -26336,6 +26465,49 @@
           <a:lstStyle/>
           <a:p>
             <a:r>
+              <a:rPr lang="en-US" sz="2400" b="1" dirty="0">
+                <a:solidFill>
+                  <a:schemeClr val="tx1"/>
+                </a:solidFill>
+                <a:latin typeface="Times New Roman" panose="02020603050405020304" pitchFamily="18" charset="0"/>
+                <a:cs typeface="Times New Roman" panose="02020603050405020304" pitchFamily="18" charset="0"/>
+              </a:rPr>
+              <a:t>Rule 302:</a:t>
+            </a:r>
+            <a:endParaRPr lang="en-US" sz="2400" dirty="0">
+              <a:solidFill>
+                <a:schemeClr val="tx1"/>
+              </a:solidFill>
+              <a:latin typeface="Times New Roman" panose="02020603050405020304" pitchFamily="18" charset="0"/>
+              <a:cs typeface="Times New Roman" panose="02020603050405020304" pitchFamily="18" charset="0"/>
+            </a:endParaRPr>
+          </a:p>
+          <a:p>
+            <a:pPr marL="342900" indent="-342900">
+              <a:buFont typeface="Arial" panose="020B0604020202020204" pitchFamily="34" charset="0"/>
+              <a:buChar char="•"/>
+            </a:pPr>
+            <a:r>
+              <a:rPr lang="en-US" sz="2400" b="1" dirty="0">
+                <a:solidFill>
+                  <a:schemeClr val="tx1"/>
+                </a:solidFill>
+                <a:latin typeface="Times New Roman" panose="02020603050405020304" pitchFamily="18" charset="0"/>
+                <a:cs typeface="Times New Roman" panose="02020603050405020304" pitchFamily="18" charset="0"/>
+              </a:rPr>
+              <a:t>IF:</a:t>
+            </a:r>
+            <a:r>
+              <a:rPr lang="en-US" sz="2400" dirty="0">
+                <a:solidFill>
+                  <a:schemeClr val="tx1"/>
+                </a:solidFill>
+                <a:latin typeface="Times New Roman" panose="02020603050405020304" pitchFamily="18" charset="0"/>
+                <a:cs typeface="Times New Roman" panose="02020603050405020304" pitchFamily="18" charset="0"/>
+              </a:rPr>
+              <a:t> </a:t>
+            </a:r>
+            <a:r>
               <a:rPr lang="en-US" sz="2400" dirty="0" err="1">
                 <a:solidFill>
                   <a:schemeClr val="tx1"/>
@@ -26343,7 +26515,7 @@
                 <a:latin typeface="Times New Roman" panose="02020603050405020304" pitchFamily="18" charset="0"/>
                 <a:cs typeface="Times New Roman" panose="02020603050405020304" pitchFamily="18" charset="0"/>
               </a:rPr>
-              <a:t>Luật</a:t>
+              <a:t>Goal_Muscle_Gain</a:t>
             </a:r>
             <a:r>
               <a:rPr lang="en-US" sz="2400" dirty="0">
@@ -26353,11 +26525,24 @@
                 <a:latin typeface="Times New Roman" panose="02020603050405020304" pitchFamily="18" charset="0"/>
                 <a:cs typeface="Times New Roman" panose="02020603050405020304" pitchFamily="18" charset="0"/>
               </a:rPr>
-              <a:t> 1: </a:t>
-            </a:r>
-          </a:p>
-          <a:p>
-            <a:pPr lvl="1"/>
+              <a:t>, Freq_4</a:t>
+            </a:r>
+          </a:p>
+          <a:p>
+            <a:pPr marL="342900" indent="-342900">
+              <a:buFont typeface="Arial" panose="020B0604020202020204" pitchFamily="34" charset="0"/>
+              <a:buChar char="•"/>
+            </a:pPr>
+            <a:r>
+              <a:rPr lang="en-US" sz="2400" b="1" dirty="0">
+                <a:solidFill>
+                  <a:schemeClr val="tx1"/>
+                </a:solidFill>
+                <a:latin typeface="Times New Roman" panose="02020603050405020304" pitchFamily="18" charset="0"/>
+                <a:cs typeface="Times New Roman" panose="02020603050405020304" pitchFamily="18" charset="0"/>
+              </a:rPr>
+              <a:t>THEN:</a:t>
+            </a:r>
             <a:r>
               <a:rPr lang="en-US" sz="2400" dirty="0">
                 <a:solidFill>
@@ -26366,7 +26551,7 @@
                 <a:latin typeface="Times New Roman" panose="02020603050405020304" pitchFamily="18" charset="0"/>
                 <a:cs typeface="Times New Roman" panose="02020603050405020304" pitchFamily="18" charset="0"/>
               </a:rPr>
-              <a:t>NẾU </a:t>
+              <a:t> Success_1, </a:t>
             </a:r>
             <a:r>
               <a:rPr lang="en-US" sz="2400" dirty="0" err="1">
@@ -26376,7 +26561,30 @@
                 <a:latin typeface="Times New Roman" panose="02020603050405020304" pitchFamily="18" charset="0"/>
                 <a:cs typeface="Times New Roman" panose="02020603050405020304" pitchFamily="18" charset="0"/>
               </a:rPr>
-              <a:t>Tần_suất</a:t>
+              <a:t>Protein_High</a:t>
+            </a:r>
+            <a:endParaRPr lang="en-US" sz="2400" dirty="0">
+              <a:solidFill>
+                <a:schemeClr val="tx1"/>
+              </a:solidFill>
+              <a:latin typeface="Times New Roman" panose="02020603050405020304" pitchFamily="18" charset="0"/>
+              <a:cs typeface="Times New Roman" panose="02020603050405020304" pitchFamily="18" charset="0"/>
+            </a:endParaRPr>
+          </a:p>
+          <a:p>
+            <a:pPr marL="342900" indent="-342900">
+              <a:buFont typeface="Arial" panose="020B0604020202020204" pitchFamily="34" charset="0"/>
+              <a:buChar char="•"/>
+            </a:pPr>
+            <a:r>
+              <a:rPr lang="en-US" sz="2400" b="1" dirty="0">
+                <a:solidFill>
+                  <a:schemeClr val="tx1"/>
+                </a:solidFill>
+                <a:latin typeface="Times New Roman" panose="02020603050405020304" pitchFamily="18" charset="0"/>
+                <a:cs typeface="Times New Roman" panose="02020603050405020304" pitchFamily="18" charset="0"/>
+              </a:rPr>
+              <a:t>Support:</a:t>
             </a:r>
             <a:r>
               <a:rPr lang="en-US" sz="2400" dirty="0">
@@ -26386,11 +26594,18 @@
                 <a:latin typeface="Times New Roman" panose="02020603050405020304" pitchFamily="18" charset="0"/>
                 <a:cs typeface="Times New Roman" panose="02020603050405020304" pitchFamily="18" charset="0"/>
               </a:rPr>
-              <a:t>=4-5 VÀ Protein=Cao</a:t>
-            </a:r>
-          </a:p>
-          <a:p>
-            <a:pPr lvl="1"/>
+              <a:t> 0.060644 | </a:t>
+            </a:r>
+            <a:r>
+              <a:rPr lang="en-US" sz="2400" b="1" dirty="0">
+                <a:solidFill>
+                  <a:schemeClr val="tx1"/>
+                </a:solidFill>
+                <a:latin typeface="Times New Roman" panose="02020603050405020304" pitchFamily="18" charset="0"/>
+                <a:cs typeface="Times New Roman" panose="02020603050405020304" pitchFamily="18" charset="0"/>
+              </a:rPr>
+              <a:t>Confidence:</a:t>
+            </a:r>
             <a:r>
               <a:rPr lang="en-US" sz="2400" dirty="0">
                 <a:solidFill>
@@ -26399,7 +26614,81 @@
                 <a:latin typeface="Times New Roman" panose="02020603050405020304" pitchFamily="18" charset="0"/>
                 <a:cs typeface="Times New Roman" panose="02020603050405020304" pitchFamily="18" charset="0"/>
               </a:rPr>
-              <a:t>THÌ </a:t>
+              <a:t> 1.000000 (100%) | </a:t>
+            </a:r>
+            <a:r>
+              <a:rPr lang="en-US" sz="2400" b="1" dirty="0">
+                <a:solidFill>
+                  <a:schemeClr val="tx1"/>
+                </a:solidFill>
+                <a:latin typeface="Times New Roman" panose="02020603050405020304" pitchFamily="18" charset="0"/>
+                <a:cs typeface="Times New Roman" panose="02020603050405020304" pitchFamily="18" charset="0"/>
+              </a:rPr>
+              <a:t>Lift:</a:t>
+            </a:r>
+            <a:r>
+              <a:rPr lang="en-US" sz="2400" dirty="0">
+                <a:solidFill>
+                  <a:schemeClr val="tx1"/>
+                </a:solidFill>
+                <a:latin typeface="Times New Roman" panose="02020603050405020304" pitchFamily="18" charset="0"/>
+                <a:cs typeface="Times New Roman" panose="02020603050405020304" pitchFamily="18" charset="0"/>
+              </a:rPr>
+              <a:t> 9.214540</a:t>
+            </a:r>
+          </a:p>
+          <a:p>
+            <a:endParaRPr lang="en-US" sz="2400" dirty="0">
+              <a:solidFill>
+                <a:schemeClr val="tx1"/>
+              </a:solidFill>
+              <a:latin typeface="Times New Roman" panose="02020603050405020304" pitchFamily="18" charset="0"/>
+              <a:cs typeface="Times New Roman" panose="02020603050405020304" pitchFamily="18" charset="0"/>
+            </a:endParaRPr>
+          </a:p>
+          <a:p>
+            <a:r>
+              <a:rPr lang="en-US" sz="2400" b="1" dirty="0">
+                <a:solidFill>
+                  <a:schemeClr val="tx1"/>
+                </a:solidFill>
+                <a:latin typeface="Times New Roman" panose="02020603050405020304" pitchFamily="18" charset="0"/>
+                <a:cs typeface="Times New Roman" panose="02020603050405020304" pitchFamily="18" charset="0"/>
+              </a:rPr>
+              <a:t>Rule 403:</a:t>
+            </a:r>
+            <a:endParaRPr lang="en-US" sz="2400" dirty="0">
+              <a:solidFill>
+                <a:schemeClr val="tx1"/>
+              </a:solidFill>
+              <a:latin typeface="Times New Roman" panose="02020603050405020304" pitchFamily="18" charset="0"/>
+              <a:cs typeface="Times New Roman" panose="02020603050405020304" pitchFamily="18" charset="0"/>
+            </a:endParaRPr>
+          </a:p>
+          <a:p>
+            <a:pPr marL="342900" indent="-342900">
+              <a:buFont typeface="Arial" panose="020B0604020202020204" pitchFamily="34" charset="0"/>
+              <a:buChar char="•"/>
+            </a:pPr>
+            <a:r>
+              <a:rPr lang="en-US" sz="2400" b="1" dirty="0">
+                <a:solidFill>
+                  <a:schemeClr val="tx1"/>
+                </a:solidFill>
+                <a:latin typeface="Times New Roman" panose="02020603050405020304" pitchFamily="18" charset="0"/>
+                <a:cs typeface="Times New Roman" panose="02020603050405020304" pitchFamily="18" charset="0"/>
+              </a:rPr>
+              <a:t>IF:</a:t>
+            </a:r>
+            <a:r>
+              <a:rPr lang="en-US" sz="2400" dirty="0">
+                <a:solidFill>
+                  <a:schemeClr val="tx1"/>
+                </a:solidFill>
+                <a:latin typeface="Times New Roman" panose="02020603050405020304" pitchFamily="18" charset="0"/>
+                <a:cs typeface="Times New Roman" panose="02020603050405020304" pitchFamily="18" charset="0"/>
+              </a:rPr>
+              <a:t> </a:t>
             </a:r>
             <a:r>
               <a:rPr lang="en-US" sz="2400" dirty="0" err="1">
@@ -26409,7 +26698,7 @@
                 <a:latin typeface="Times New Roman" panose="02020603050405020304" pitchFamily="18" charset="0"/>
                 <a:cs typeface="Times New Roman" panose="02020603050405020304" pitchFamily="18" charset="0"/>
               </a:rPr>
-              <a:t>Thành_công</a:t>
+              <a:t>Goal_Muscle_Gain</a:t>
             </a:r>
             <a:r>
               <a:rPr lang="en-US" sz="2400" dirty="0">
@@ -26419,11 +26708,8 @@
                 <a:latin typeface="Times New Roman" panose="02020603050405020304" pitchFamily="18" charset="0"/>
                 <a:cs typeface="Times New Roman" panose="02020603050405020304" pitchFamily="18" charset="0"/>
               </a:rPr>
-              <a:t>=1</a:t>
-            </a:r>
-          </a:p>
-          <a:p>
-            <a:pPr lvl="1"/>
+              <a:t>, Freq_4, </a:t>
+            </a:r>
             <a:r>
               <a:rPr lang="en-US" sz="2400" dirty="0" err="1">
                 <a:solidFill>
@@ -26432,7 +26718,30 @@
                 <a:latin typeface="Times New Roman" panose="02020603050405020304" pitchFamily="18" charset="0"/>
                 <a:cs typeface="Times New Roman" panose="02020603050405020304" pitchFamily="18" charset="0"/>
               </a:rPr>
-              <a:t>Hỗ</a:t>
+              <a:t>Time_Morning</a:t>
+            </a:r>
+            <a:endParaRPr lang="en-US" sz="2400" dirty="0">
+              <a:solidFill>
+                <a:schemeClr val="tx1"/>
+              </a:solidFill>
+              <a:latin typeface="Times New Roman" panose="02020603050405020304" pitchFamily="18" charset="0"/>
+              <a:cs typeface="Times New Roman" panose="02020603050405020304" pitchFamily="18" charset="0"/>
+            </a:endParaRPr>
+          </a:p>
+          <a:p>
+            <a:pPr marL="342900" indent="-342900">
+              <a:buFont typeface="Arial" panose="020B0604020202020204" pitchFamily="34" charset="0"/>
+              <a:buChar char="•"/>
+            </a:pPr>
+            <a:r>
+              <a:rPr lang="en-US" sz="2400" b="1" dirty="0">
+                <a:solidFill>
+                  <a:schemeClr val="tx1"/>
+                </a:solidFill>
+                <a:latin typeface="Times New Roman" panose="02020603050405020304" pitchFamily="18" charset="0"/>
+                <a:cs typeface="Times New Roman" panose="02020603050405020304" pitchFamily="18" charset="0"/>
+              </a:rPr>
+              <a:t>THEN:</a:t>
             </a:r>
             <a:r>
               <a:rPr lang="en-US" sz="2400" dirty="0">
@@ -26442,6 +26751,186 @@
                 <a:latin typeface="Times New Roman" panose="02020603050405020304" pitchFamily="18" charset="0"/>
                 <a:cs typeface="Times New Roman" panose="02020603050405020304" pitchFamily="18" charset="0"/>
               </a:rPr>
+              <a:t> Success_1, </a:t>
+            </a:r>
+            <a:r>
+              <a:rPr lang="en-US" sz="2400" dirty="0" err="1">
+                <a:solidFill>
+                  <a:schemeClr val="tx1"/>
+                </a:solidFill>
+                <a:latin typeface="Times New Roman" panose="02020603050405020304" pitchFamily="18" charset="0"/>
+                <a:cs typeface="Times New Roman" panose="02020603050405020304" pitchFamily="18" charset="0"/>
+              </a:rPr>
+              <a:t>Protein_High</a:t>
+            </a:r>
+            <a:endParaRPr lang="en-US" sz="2400" dirty="0">
+              <a:solidFill>
+                <a:schemeClr val="tx1"/>
+              </a:solidFill>
+              <a:latin typeface="Times New Roman" panose="02020603050405020304" pitchFamily="18" charset="0"/>
+              <a:cs typeface="Times New Roman" panose="02020603050405020304" pitchFamily="18" charset="0"/>
+            </a:endParaRPr>
+          </a:p>
+          <a:p>
+            <a:pPr marL="342900" indent="-342900">
+              <a:buFont typeface="Arial" panose="020B0604020202020204" pitchFamily="34" charset="0"/>
+              <a:buChar char="•"/>
+            </a:pPr>
+            <a:r>
+              <a:rPr lang="en-US" sz="2400" b="1" dirty="0">
+                <a:solidFill>
+                  <a:schemeClr val="tx1"/>
+                </a:solidFill>
+                <a:latin typeface="Times New Roman" panose="02020603050405020304" pitchFamily="18" charset="0"/>
+                <a:cs typeface="Times New Roman" panose="02020603050405020304" pitchFamily="18" charset="0"/>
+              </a:rPr>
+              <a:t>Support:</a:t>
+            </a:r>
+            <a:r>
+              <a:rPr lang="en-US" sz="2400" dirty="0">
+                <a:solidFill>
+                  <a:schemeClr val="tx1"/>
+                </a:solidFill>
+                <a:latin typeface="Times New Roman" panose="02020603050405020304" pitchFamily="18" charset="0"/>
+                <a:cs typeface="Times New Roman" panose="02020603050405020304" pitchFamily="18" charset="0"/>
+              </a:rPr>
+              <a:t> 0.022741 | </a:t>
+            </a:r>
+            <a:r>
+              <a:rPr lang="en-US" sz="2400" b="1" dirty="0">
+                <a:solidFill>
+                  <a:schemeClr val="tx1"/>
+                </a:solidFill>
+                <a:latin typeface="Times New Roman" panose="02020603050405020304" pitchFamily="18" charset="0"/>
+                <a:cs typeface="Times New Roman" panose="02020603050405020304" pitchFamily="18" charset="0"/>
+              </a:rPr>
+              <a:t>Confidence:</a:t>
+            </a:r>
+            <a:r>
+              <a:rPr lang="en-US" sz="2400" dirty="0">
+                <a:solidFill>
+                  <a:schemeClr val="tx1"/>
+                </a:solidFill>
+                <a:latin typeface="Times New Roman" panose="02020603050405020304" pitchFamily="18" charset="0"/>
+                <a:cs typeface="Times New Roman" panose="02020603050405020304" pitchFamily="18" charset="0"/>
+              </a:rPr>
+              <a:t> 1.000000 (100%) | </a:t>
+            </a:r>
+            <a:r>
+              <a:rPr lang="en-US" sz="2400" b="1" dirty="0">
+                <a:solidFill>
+                  <a:schemeClr val="tx1"/>
+                </a:solidFill>
+                <a:latin typeface="Times New Roman" panose="02020603050405020304" pitchFamily="18" charset="0"/>
+                <a:cs typeface="Times New Roman" panose="02020603050405020304" pitchFamily="18" charset="0"/>
+              </a:rPr>
+              <a:t>Lift:</a:t>
+            </a:r>
+            <a:r>
+              <a:rPr lang="en-US" sz="2400" dirty="0">
+                <a:solidFill>
+                  <a:schemeClr val="tx1"/>
+                </a:solidFill>
+                <a:latin typeface="Times New Roman" panose="02020603050405020304" pitchFamily="18" charset="0"/>
+                <a:cs typeface="Times New Roman" panose="02020603050405020304" pitchFamily="18" charset="0"/>
+              </a:rPr>
+              <a:t> 9.214540</a:t>
+            </a:r>
+          </a:p>
+          <a:p>
+            <a:endParaRPr lang="en-US" sz="2400" dirty="0">
+              <a:solidFill>
+                <a:schemeClr val="tx1"/>
+              </a:solidFill>
+              <a:latin typeface="Times New Roman" panose="02020603050405020304" pitchFamily="18" charset="0"/>
+              <a:cs typeface="Times New Roman" panose="02020603050405020304" pitchFamily="18" charset="0"/>
+            </a:endParaRPr>
+          </a:p>
+          <a:p>
+            <a:r>
+              <a:rPr lang="en-US" sz="2400" b="1" dirty="0">
+                <a:solidFill>
+                  <a:schemeClr val="tx1"/>
+                </a:solidFill>
+                <a:latin typeface="Times New Roman" panose="02020603050405020304" pitchFamily="18" charset="0"/>
+                <a:cs typeface="Times New Roman" panose="02020603050405020304" pitchFamily="18" charset="0"/>
+              </a:rPr>
+              <a:t>Rule 303:</a:t>
+            </a:r>
+            <a:endParaRPr lang="en-US" sz="2400" dirty="0">
+              <a:solidFill>
+                <a:schemeClr val="tx1"/>
+              </a:solidFill>
+              <a:latin typeface="Times New Roman" panose="02020603050405020304" pitchFamily="18" charset="0"/>
+              <a:cs typeface="Times New Roman" panose="02020603050405020304" pitchFamily="18" charset="0"/>
+            </a:endParaRPr>
+          </a:p>
+          <a:p>
+            <a:pPr marL="342900" indent="-342900">
+              <a:buFont typeface="Arial" panose="020B0604020202020204" pitchFamily="34" charset="0"/>
+              <a:buChar char="•"/>
+            </a:pPr>
+            <a:r>
+              <a:rPr lang="en-US" sz="2400" b="1" dirty="0">
+                <a:solidFill>
+                  <a:schemeClr val="tx1"/>
+                </a:solidFill>
+                <a:latin typeface="Times New Roman" panose="02020603050405020304" pitchFamily="18" charset="0"/>
+                <a:cs typeface="Times New Roman" panose="02020603050405020304" pitchFamily="18" charset="0"/>
+              </a:rPr>
+              <a:t>IF:</a:t>
+            </a:r>
+            <a:r>
+              <a:rPr lang="en-US" sz="2400" dirty="0">
+                <a:solidFill>
+                  <a:schemeClr val="tx1"/>
+                </a:solidFill>
+                <a:latin typeface="Times New Roman" panose="02020603050405020304" pitchFamily="18" charset="0"/>
+                <a:cs typeface="Times New Roman" panose="02020603050405020304" pitchFamily="18" charset="0"/>
+              </a:rPr>
+              <a:t> Freq_4, </a:t>
+            </a:r>
+            <a:r>
+              <a:rPr lang="en-US" sz="2400" dirty="0" err="1">
+                <a:solidFill>
+                  <a:schemeClr val="tx1"/>
+                </a:solidFill>
+                <a:latin typeface="Times New Roman" panose="02020603050405020304" pitchFamily="18" charset="0"/>
+                <a:cs typeface="Times New Roman" panose="02020603050405020304" pitchFamily="18" charset="0"/>
+              </a:rPr>
+              <a:t>Protein_High</a:t>
+            </a:r>
+            <a:endParaRPr lang="en-US" sz="2400" dirty="0">
+              <a:solidFill>
+                <a:schemeClr val="tx1"/>
+              </a:solidFill>
+              <a:latin typeface="Times New Roman" panose="02020603050405020304" pitchFamily="18" charset="0"/>
+              <a:cs typeface="Times New Roman" panose="02020603050405020304" pitchFamily="18" charset="0"/>
+            </a:endParaRPr>
+          </a:p>
+          <a:p>
+            <a:pPr marL="342900" indent="-342900">
+              <a:buFont typeface="Arial" panose="020B0604020202020204" pitchFamily="34" charset="0"/>
+              <a:buChar char="•"/>
+            </a:pPr>
+            <a:r>
+              <a:rPr lang="en-US" sz="2400" b="1" dirty="0">
+                <a:solidFill>
+                  <a:schemeClr val="tx1"/>
+                </a:solidFill>
+                <a:latin typeface="Times New Roman" panose="02020603050405020304" pitchFamily="18" charset="0"/>
+                <a:cs typeface="Times New Roman" panose="02020603050405020304" pitchFamily="18" charset="0"/>
+              </a:rPr>
+              <a:t>THEN:</a:t>
+            </a:r>
+            <a:r>
+              <a:rPr lang="en-US" sz="2400" dirty="0">
+                <a:solidFill>
+                  <a:schemeClr val="tx1"/>
+                </a:solidFill>
+                <a:latin typeface="Times New Roman" panose="02020603050405020304" pitchFamily="18" charset="0"/>
+                <a:cs typeface="Times New Roman" panose="02020603050405020304" pitchFamily="18" charset="0"/>
+              </a:rPr>
               <a:t> </a:t>
             </a:r>
             <a:r>
@@ -26452,7 +26941,7 @@
                 <a:latin typeface="Times New Roman" panose="02020603050405020304" pitchFamily="18" charset="0"/>
                 <a:cs typeface="Times New Roman" panose="02020603050405020304" pitchFamily="18" charset="0"/>
               </a:rPr>
-              <a:t>trợ</a:t>
+              <a:t>Goal_Muscle_Gain</a:t>
             </a:r>
             <a:r>
               <a:rPr lang="en-US" sz="2400" dirty="0">
@@ -26462,7 +26951,127 @@
                 <a:latin typeface="Times New Roman" panose="02020603050405020304" pitchFamily="18" charset="0"/>
                 <a:cs typeface="Times New Roman" panose="02020603050405020304" pitchFamily="18" charset="0"/>
               </a:rPr>
-              <a:t>: 0.18 | Tin </a:t>
+              <a:t>, Success_1</a:t>
+            </a:r>
+          </a:p>
+          <a:p>
+            <a:pPr marL="342900" indent="-342900">
+              <a:buFont typeface="Arial" panose="020B0604020202020204" pitchFamily="34" charset="0"/>
+              <a:buChar char="•"/>
+            </a:pPr>
+            <a:r>
+              <a:rPr lang="en-US" sz="2400" b="1" dirty="0">
+                <a:solidFill>
+                  <a:schemeClr val="tx1"/>
+                </a:solidFill>
+                <a:latin typeface="Times New Roman" panose="02020603050405020304" pitchFamily="18" charset="0"/>
+                <a:cs typeface="Times New Roman" panose="02020603050405020304" pitchFamily="18" charset="0"/>
+              </a:rPr>
+              <a:t>Support:</a:t>
+            </a:r>
+            <a:r>
+              <a:rPr lang="en-US" sz="2400" dirty="0">
+                <a:solidFill>
+                  <a:schemeClr val="tx1"/>
+                </a:solidFill>
+                <a:latin typeface="Times New Roman" panose="02020603050405020304" pitchFamily="18" charset="0"/>
+                <a:cs typeface="Times New Roman" panose="02020603050405020304" pitchFamily="18" charset="0"/>
+              </a:rPr>
+              <a:t> 0.060644 | </a:t>
+            </a:r>
+            <a:r>
+              <a:rPr lang="en-US" sz="2400" b="1" dirty="0">
+                <a:solidFill>
+                  <a:schemeClr val="tx1"/>
+                </a:solidFill>
+                <a:latin typeface="Times New Roman" panose="02020603050405020304" pitchFamily="18" charset="0"/>
+                <a:cs typeface="Times New Roman" panose="02020603050405020304" pitchFamily="18" charset="0"/>
+              </a:rPr>
+              <a:t>Confidence:</a:t>
+            </a:r>
+            <a:r>
+              <a:rPr lang="en-US" sz="2400" dirty="0">
+                <a:solidFill>
+                  <a:schemeClr val="tx1"/>
+                </a:solidFill>
+                <a:latin typeface="Times New Roman" panose="02020603050405020304" pitchFamily="18" charset="0"/>
+                <a:cs typeface="Times New Roman" panose="02020603050405020304" pitchFamily="18" charset="0"/>
+              </a:rPr>
+              <a:t> 1.000000 (100%) | </a:t>
+            </a:r>
+            <a:r>
+              <a:rPr lang="en-US" sz="2400" b="1" dirty="0">
+                <a:solidFill>
+                  <a:schemeClr val="tx1"/>
+                </a:solidFill>
+                <a:latin typeface="Times New Roman" panose="02020603050405020304" pitchFamily="18" charset="0"/>
+                <a:cs typeface="Times New Roman" panose="02020603050405020304" pitchFamily="18" charset="0"/>
+              </a:rPr>
+              <a:t>Lift:</a:t>
+            </a:r>
+            <a:r>
+              <a:rPr lang="en-US" sz="2400" dirty="0">
+                <a:solidFill>
+                  <a:schemeClr val="tx1"/>
+                </a:solidFill>
+                <a:latin typeface="Times New Roman" panose="02020603050405020304" pitchFamily="18" charset="0"/>
+                <a:cs typeface="Times New Roman" panose="02020603050405020304" pitchFamily="18" charset="0"/>
+              </a:rPr>
+              <a:t> 9.214540</a:t>
+            </a:r>
+          </a:p>
+          <a:p>
+            <a:endParaRPr lang="en-US" sz="2400" dirty="0">
+              <a:solidFill>
+                <a:schemeClr val="tx1"/>
+              </a:solidFill>
+              <a:latin typeface="Times New Roman" panose="02020603050405020304" pitchFamily="18" charset="0"/>
+              <a:cs typeface="Times New Roman" panose="02020603050405020304" pitchFamily="18" charset="0"/>
+            </a:endParaRPr>
+          </a:p>
+          <a:p>
+            <a:r>
+              <a:rPr lang="en-US" sz="2400" b="1" dirty="0">
+                <a:solidFill>
+                  <a:schemeClr val="tx1"/>
+                </a:solidFill>
+                <a:latin typeface="Times New Roman" panose="02020603050405020304" pitchFamily="18" charset="0"/>
+                <a:cs typeface="Times New Roman" panose="02020603050405020304" pitchFamily="18" charset="0"/>
+              </a:rPr>
+              <a:t>Rule 364:</a:t>
+            </a:r>
+            <a:endParaRPr lang="en-US" sz="2400" dirty="0">
+              <a:solidFill>
+                <a:schemeClr val="tx1"/>
+              </a:solidFill>
+              <a:latin typeface="Times New Roman" panose="02020603050405020304" pitchFamily="18" charset="0"/>
+              <a:cs typeface="Times New Roman" panose="02020603050405020304" pitchFamily="18" charset="0"/>
+            </a:endParaRPr>
+          </a:p>
+          <a:p>
+            <a:pPr marL="342900" indent="-342900">
+              <a:buFont typeface="Arial" panose="020B0604020202020204" pitchFamily="34" charset="0"/>
+              <a:buChar char="•"/>
+            </a:pPr>
+            <a:r>
+              <a:rPr lang="en-US" sz="2400" b="1" dirty="0">
+                <a:solidFill>
+                  <a:schemeClr val="tx1"/>
+                </a:solidFill>
+                <a:latin typeface="Times New Roman" panose="02020603050405020304" pitchFamily="18" charset="0"/>
+                <a:cs typeface="Times New Roman" panose="02020603050405020304" pitchFamily="18" charset="0"/>
+              </a:rPr>
+              <a:t>IF:</a:t>
+            </a:r>
+            <a:r>
+              <a:rPr lang="en-US" sz="2400" dirty="0">
+                <a:solidFill>
+                  <a:schemeClr val="tx1"/>
+                </a:solidFill>
+                <a:latin typeface="Times New Roman" panose="02020603050405020304" pitchFamily="18" charset="0"/>
+                <a:cs typeface="Times New Roman" panose="02020603050405020304" pitchFamily="18" charset="0"/>
+              </a:rPr>
+              <a:t> </a:t>
             </a:r>
             <a:r>
               <a:rPr lang="en-US" sz="2400" dirty="0" err="1">
@@ -26472,7 +27081,7 @@
                 <a:latin typeface="Times New Roman" panose="02020603050405020304" pitchFamily="18" charset="0"/>
                 <a:cs typeface="Times New Roman" panose="02020603050405020304" pitchFamily="18" charset="0"/>
               </a:rPr>
-              <a:t>cậy</a:t>
+              <a:t>Protein_High</a:t>
             </a:r>
             <a:r>
               <a:rPr lang="en-US" sz="2400" dirty="0">
@@ -26482,7 +27091,7 @@
                 <a:latin typeface="Times New Roman" panose="02020603050405020304" pitchFamily="18" charset="0"/>
                 <a:cs typeface="Times New Roman" panose="02020603050405020304" pitchFamily="18" charset="0"/>
               </a:rPr>
-              <a:t>: 100% | </a:t>
+              <a:t>, </a:t>
             </a:r>
             <a:r>
               <a:rPr lang="en-US" sz="2400" dirty="0" err="1">
@@ -26492,7 +27101,30 @@
                 <a:latin typeface="Times New Roman" panose="02020603050405020304" pitchFamily="18" charset="0"/>
                 <a:cs typeface="Times New Roman" panose="02020603050405020304" pitchFamily="18" charset="0"/>
               </a:rPr>
-              <a:t>Nâng</a:t>
+              <a:t>Time_Afternoon</a:t>
+            </a:r>
+            <a:endParaRPr lang="en-US" sz="2400" dirty="0">
+              <a:solidFill>
+                <a:schemeClr val="tx1"/>
+              </a:solidFill>
+              <a:latin typeface="Times New Roman" panose="02020603050405020304" pitchFamily="18" charset="0"/>
+              <a:cs typeface="Times New Roman" panose="02020603050405020304" pitchFamily="18" charset="0"/>
+            </a:endParaRPr>
+          </a:p>
+          <a:p>
+            <a:pPr marL="342900" indent="-342900">
+              <a:buFont typeface="Arial" panose="020B0604020202020204" pitchFamily="34" charset="0"/>
+              <a:buChar char="•"/>
+            </a:pPr>
+            <a:r>
+              <a:rPr lang="en-US" sz="2400" b="1" dirty="0">
+                <a:solidFill>
+                  <a:schemeClr val="tx1"/>
+                </a:solidFill>
+                <a:latin typeface="Times New Roman" panose="02020603050405020304" pitchFamily="18" charset="0"/>
+                <a:cs typeface="Times New Roman" panose="02020603050405020304" pitchFamily="18" charset="0"/>
+              </a:rPr>
+              <a:t>THEN:</a:t>
             </a:r>
             <a:r>
               <a:rPr lang="en-US" sz="2400" dirty="0">
@@ -26502,10 +27134,8 @@
                 <a:latin typeface="Times New Roman" panose="02020603050405020304" pitchFamily="18" charset="0"/>
                 <a:cs typeface="Times New Roman" panose="02020603050405020304" pitchFamily="18" charset="0"/>
               </a:rPr>
-              <a:t>: 1.79</a:t>
-            </a:r>
-          </a:p>
-          <a:p>
+              <a:t> </a:t>
+            </a:r>
             <a:r>
               <a:rPr lang="en-US" sz="2400" dirty="0" err="1">
                 <a:solidFill>
@@ -26514,7 +27144,7 @@
                 <a:latin typeface="Times New Roman" panose="02020603050405020304" pitchFamily="18" charset="0"/>
                 <a:cs typeface="Times New Roman" panose="02020603050405020304" pitchFamily="18" charset="0"/>
               </a:rPr>
-              <a:t>Luật</a:t>
+              <a:t>Goal_Muscle_Gain</a:t>
             </a:r>
             <a:r>
               <a:rPr lang="en-US" sz="2400" dirty="0">
@@ -26524,127 +27154,94 @@
                 <a:latin typeface="Times New Roman" panose="02020603050405020304" pitchFamily="18" charset="0"/>
                 <a:cs typeface="Times New Roman" panose="02020603050405020304" pitchFamily="18" charset="0"/>
               </a:rPr>
-              <a:t> 2:</a:t>
-            </a:r>
-          </a:p>
-          <a:p>
-            <a:pPr lvl="1"/>
-            <a:r>
-              <a:rPr lang="vi-VN" sz="2400" dirty="0">
+              <a:t>, Success_1</a:t>
+            </a:r>
+          </a:p>
+          <a:p>
+            <a:pPr marL="342900" indent="-342900">
+              <a:buFont typeface="Arial" panose="020B0604020202020204" pitchFamily="34" charset="0"/>
+              <a:buChar char="•"/>
+            </a:pPr>
+            <a:r>
+              <a:rPr lang="en-US" sz="2400" b="1" dirty="0">
                 <a:solidFill>
                   <a:schemeClr val="tx1"/>
                 </a:solidFill>
                 <a:latin typeface="Times New Roman" panose="02020603050405020304" pitchFamily="18" charset="0"/>
                 <a:cs typeface="Times New Roman" panose="02020603050405020304" pitchFamily="18" charset="0"/>
               </a:rPr>
-              <a:t>NẾU </a:t>
-            </a:r>
-            <a:r>
-              <a:rPr lang="vi-VN" sz="2400" dirty="0" err="1">
+              <a:t>Support:</a:t>
+            </a:r>
+            <a:r>
+              <a:rPr lang="en-US" sz="2400" dirty="0">
                 <a:solidFill>
                   <a:schemeClr val="tx1"/>
                 </a:solidFill>
                 <a:latin typeface="Times New Roman" panose="02020603050405020304" pitchFamily="18" charset="0"/>
                 <a:cs typeface="Times New Roman" panose="02020603050405020304" pitchFamily="18" charset="0"/>
               </a:rPr>
-              <a:t>Mục_tiêu</a:t>
-            </a:r>
-            <a:r>
-              <a:rPr lang="vi-VN" sz="2400" dirty="0">
+              <a:t> 0.035891 | </a:t>
+            </a:r>
+            <a:r>
+              <a:rPr lang="en-US" sz="2400" b="1" dirty="0">
                 <a:solidFill>
                   <a:schemeClr val="tx1"/>
                 </a:solidFill>
                 <a:latin typeface="Times New Roman" panose="02020603050405020304" pitchFamily="18" charset="0"/>
                 <a:cs typeface="Times New Roman" panose="02020603050405020304" pitchFamily="18" charset="0"/>
               </a:rPr>
-              <a:t>=</a:t>
-            </a:r>
-            <a:r>
-              <a:rPr lang="vi-VN" sz="2400" dirty="0" err="1">
+              <a:t>Confidence:</a:t>
+            </a:r>
+            <a:r>
+              <a:rPr lang="en-US" sz="2400" dirty="0">
                 <a:solidFill>
                   <a:schemeClr val="tx1"/>
                 </a:solidFill>
                 <a:latin typeface="Times New Roman" panose="02020603050405020304" pitchFamily="18" charset="0"/>
                 <a:cs typeface="Times New Roman" panose="02020603050405020304" pitchFamily="18" charset="0"/>
               </a:rPr>
-              <a:t>Tăng_Cơ</a:t>
-            </a:r>
-            <a:r>
-              <a:rPr lang="vi-VN" sz="2400" dirty="0">
+              <a:t> 0.660969 (66%) | </a:t>
+            </a:r>
+            <a:r>
+              <a:rPr lang="en-US" sz="2400" b="1" dirty="0">
                 <a:solidFill>
                   <a:schemeClr val="tx1"/>
                 </a:solidFill>
                 <a:latin typeface="Times New Roman" panose="02020603050405020304" pitchFamily="18" charset="0"/>
                 <a:cs typeface="Times New Roman" panose="02020603050405020304" pitchFamily="18" charset="0"/>
               </a:rPr>
-              <a:t> VÀ </a:t>
-            </a:r>
-            <a:r>
-              <a:rPr lang="vi-VN" sz="2400" dirty="0" err="1">
+              <a:t>Lift:</a:t>
+            </a:r>
+            <a:r>
+              <a:rPr lang="en-US" sz="2400" dirty="0">
                 <a:solidFill>
                   <a:schemeClr val="tx1"/>
                 </a:solidFill>
                 <a:latin typeface="Times New Roman" panose="02020603050405020304" pitchFamily="18" charset="0"/>
                 <a:cs typeface="Times New Roman" panose="02020603050405020304" pitchFamily="18" charset="0"/>
               </a:rPr>
-              <a:t>Workout</a:t>
-            </a:r>
-            <a:r>
-              <a:rPr lang="vi-VN" sz="2400" dirty="0">
-                <a:solidFill>
-                  <a:schemeClr val="tx1"/>
-                </a:solidFill>
-                <a:latin typeface="Times New Roman" panose="02020603050405020304" pitchFamily="18" charset="0"/>
-                <a:cs typeface="Times New Roman" panose="02020603050405020304" pitchFamily="18" charset="0"/>
-              </a:rPr>
-              <a:t>=Tạ</a:t>
-            </a:r>
-          </a:p>
-          <a:p>
-            <a:pPr lvl="1"/>
-            <a:r>
-              <a:rPr lang="vi-VN" sz="2400" dirty="0">
-                <a:solidFill>
-                  <a:schemeClr val="tx1"/>
-                </a:solidFill>
-                <a:latin typeface="Times New Roman" panose="02020603050405020304" pitchFamily="18" charset="0"/>
-                <a:cs typeface="Times New Roman" panose="02020603050405020304" pitchFamily="18" charset="0"/>
-              </a:rPr>
-              <a:t>THÌ </a:t>
-            </a:r>
-            <a:r>
-              <a:rPr lang="vi-VN" sz="2400" dirty="0" err="1">
-                <a:solidFill>
-                  <a:schemeClr val="tx1"/>
-                </a:solidFill>
-                <a:latin typeface="Times New Roman" panose="02020603050405020304" pitchFamily="18" charset="0"/>
-                <a:cs typeface="Times New Roman" panose="02020603050405020304" pitchFamily="18" charset="0"/>
-              </a:rPr>
-              <a:t>Thành_công</a:t>
-            </a:r>
-            <a:r>
-              <a:rPr lang="vi-VN" sz="2400" dirty="0">
-                <a:solidFill>
-                  <a:schemeClr val="tx1"/>
-                </a:solidFill>
-                <a:latin typeface="Times New Roman" panose="02020603050405020304" pitchFamily="18" charset="0"/>
-                <a:cs typeface="Times New Roman" panose="02020603050405020304" pitchFamily="18" charset="0"/>
-              </a:rPr>
-              <a:t>=1</a:t>
-            </a:r>
-          </a:p>
-          <a:p>
-            <a:pPr lvl="1"/>
-            <a:r>
-              <a:rPr lang="vi-VN" sz="2400" dirty="0">
-                <a:solidFill>
-                  <a:schemeClr val="tx1"/>
-                </a:solidFill>
-                <a:latin typeface="Times New Roman" panose="02020603050405020304" pitchFamily="18" charset="0"/>
-                <a:cs typeface="Times New Roman" panose="02020603050405020304" pitchFamily="18" charset="0"/>
-              </a:rPr>
-              <a:t>Hỗ trợ: 0.12 | Tin cậy: 95% | Nâng: 1.71</a:t>
-            </a:r>
+              <a:t> 6.090522</a:t>
+            </a:r>
+          </a:p>
+          <a:p>
+            <a:endParaRPr lang="en-US" sz="2400" dirty="0">
+              <a:solidFill>
+                <a:schemeClr val="tx1"/>
+              </a:solidFill>
+              <a:latin typeface="Times New Roman" panose="02020603050405020304" pitchFamily="18" charset="0"/>
+              <a:cs typeface="Times New Roman" panose="02020603050405020304" pitchFamily="18" charset="0"/>
+            </a:endParaRPr>
+          </a:p>
+          <a:p>
+            <a:endParaRPr lang="en-US" sz="2400" dirty="0">
+              <a:solidFill>
+                <a:schemeClr val="tx1"/>
+              </a:solidFill>
+              <a:latin typeface="Times New Roman" panose="02020603050405020304" pitchFamily="18" charset="0"/>
+              <a:cs typeface="Times New Roman" panose="02020603050405020304" pitchFamily="18" charset="0"/>
+            </a:endParaRPr>
+          </a:p>
+          <a:p>
             <a:endParaRPr lang="en-US" sz="2400" dirty="0">
               <a:solidFill>
                 <a:schemeClr val="tx1"/>
@@ -26669,8 +27266,8 @@
         </p:nvSpPr>
         <p:spPr>
           <a:xfrm>
-            <a:off x="10276122" y="2029047"/>
-            <a:ext cx="6868880" cy="609600"/>
+            <a:off x="7912868" y="1336542"/>
+            <a:ext cx="10069278" cy="609600"/>
           </a:xfrm>
           <a:prstGeom prst="rect">
             <a:avLst/>
@@ -27009,6 +27606,112 @@
               </a:rPr>
               <a:t>9/16</a:t>
             </a:r>
+          </a:p>
+        </p:txBody>
+      </p:sp>
+      <p:sp>
+        <p:nvSpPr>
+          <p:cNvPr id="7" name="Rectangle 1">
+            <a:extLst>
+              <a:ext uri="{FF2B5EF4-FFF2-40B4-BE49-F238E27FC236}">
+                <a16:creationId xmlns:a16="http://schemas.microsoft.com/office/drawing/2014/main" id="{FD0A3188-B258-925F-8D67-F2B947D5CC83}"/>
+              </a:ext>
+            </a:extLst>
+          </p:cNvPr>
+          <p:cNvSpPr>
+            <a:spLocks noChangeArrowheads="1"/>
+          </p:cNvSpPr>
+          <p:nvPr/>
+        </p:nvSpPr>
+        <p:spPr bwMode="auto">
+          <a:xfrm>
+            <a:off x="457200" y="3695700"/>
+            <a:ext cx="18288000" cy="0"/>
+          </a:xfrm>
+          <a:prstGeom prst="rect">
+            <a:avLst/>
+          </a:prstGeom>
+          <a:noFill/>
+          <a:ln>
+            <a:noFill/>
+          </a:ln>
+          <a:effectLst/>
+          <a:extLst>
+            <a:ext uri="{909E8E84-426E-40DD-AFC4-6F175D3DCCD1}">
+              <a14:hiddenFill xmlns:a14="http://schemas.microsoft.com/office/drawing/2010/main">
+                <a:solidFill>
+                  <a:schemeClr val="accent1"/>
+                </a:solidFill>
+              </a14:hiddenFill>
+            </a:ext>
+            <a:ext uri="{91240B29-F687-4F45-9708-019B960494DF}">
+              <a14:hiddenLine xmlns:a14="http://schemas.microsoft.com/office/drawing/2010/main" w="9525">
+                <a:solidFill>
+                  <a:schemeClr val="tx1"/>
+                </a:solidFill>
+                <a:miter lim="800000"/>
+                <a:headEnd/>
+                <a:tailEnd/>
+              </a14:hiddenLine>
+            </a:ext>
+            <a:ext uri="{AF507438-7753-43E0-B8FC-AC1667EBCBE1}">
+              <a14:hiddenEffects xmlns:a14="http://schemas.microsoft.com/office/drawing/2010/main">
+                <a:effectLst>
+                  <a:outerShdw dist="35921" dir="2700000" algn="ctr" rotWithShape="0">
+                    <a:schemeClr val="bg2"/>
+                  </a:outerShdw>
+                </a:effectLst>
+              </a14:hiddenEffects>
+            </a:ext>
+          </a:extLst>
+        </p:spPr>
+        <p:txBody>
+          <a:bodyPr vert="horz" wrap="none" lIns="91440" tIns="45720" rIns="91440" bIns="45720" numCol="1" anchor="ctr" anchorCtr="0" compatLnSpc="1">
+            <a:prstTxWarp prst="textNoShape">
+              <a:avLst/>
+            </a:prstTxWarp>
+            <a:spAutoFit/>
+          </a:bodyPr>
+          <a:lstStyle/>
+          <a:p>
+            <a:pPr marL="0" marR="0" lvl="0" indent="0" algn="l" defTabSz="914400" rtl="0" eaLnBrk="0" fontAlgn="base" latinLnBrk="0" hangingPunct="0">
+              <a:lnSpc>
+                <a:spcPct val="100000"/>
+              </a:lnSpc>
+              <a:spcBef>
+                <a:spcPct val="0"/>
+              </a:spcBef>
+              <a:spcAft>
+                <a:spcPct val="0"/>
+              </a:spcAft>
+              <a:buClrTx/>
+              <a:buSzTx/>
+              <a:buFontTx/>
+              <a:buNone/>
+              <a:tabLst/>
+            </a:pPr>
+            <a:br>
+              <a:rPr kumimoji="0" lang="en-US" altLang="en-US" sz="1800" b="0" i="0" u="none" strike="noStrike" cap="none" normalizeH="0" baseline="0">
+                <a:ln>
+                  <a:noFill/>
+                </a:ln>
+                <a:solidFill>
+                  <a:schemeClr val="tx1"/>
+                </a:solidFill>
+                <a:effectLst/>
+                <a:latin typeface="Arial" panose="020B0604020202020204" pitchFamily="34" charset="0"/>
+              </a:rPr>
+            </a:br>
+            <a:endParaRPr kumimoji="0" lang="en-US" altLang="en-US" sz="1800" b="0" i="0" u="none" strike="noStrike" cap="none" normalizeH="0" baseline="0">
+              <a:ln>
+                <a:noFill/>
+              </a:ln>
+              <a:solidFill>
+                <a:schemeClr val="tx1"/>
+              </a:solidFill>
+              <a:effectLst/>
+              <a:latin typeface="Arial" panose="020B0604020202020204" pitchFamily="34" charset="0"/>
+            </a:endParaRPr>
           </a:p>
         </p:txBody>
       </p:sp>

</xml_diff>